<commit_message>
started with new layout
</commit_message>
<xml_diff>
--- a/stuff/layout_sketches.pptx
+++ b/stuff/layout_sketches.pptx
@@ -6,6 +6,7 @@
   </p:sldMasterIdLst>
   <p:sldIdLst>
     <p:sldId id="256" r:id="rId2"/>
+    <p:sldId id="257" r:id="rId3"/>
   </p:sldIdLst>
   <p:sldSz cx="12192000" cy="6858000"/>
   <p:notesSz cx="6858000" cy="9144000"/>
@@ -259,7 +260,7 @@
           <a:p>
             <a:fld id="{24E1D275-1CBF-4F78-876E-30D195C0EF8B}" type="datetimeFigureOut">
               <a:rPr lang="de-DE" smtClean="0"/>
-              <a:t>01.05.2021</a:t>
+              <a:t>20.05.2021</a:t>
             </a:fld>
             <a:endParaRPr lang="de-DE"/>
           </a:p>
@@ -457,7 +458,7 @@
           <a:p>
             <a:fld id="{24E1D275-1CBF-4F78-876E-30D195C0EF8B}" type="datetimeFigureOut">
               <a:rPr lang="de-DE" smtClean="0"/>
-              <a:t>01.05.2021</a:t>
+              <a:t>20.05.2021</a:t>
             </a:fld>
             <a:endParaRPr lang="de-DE"/>
           </a:p>
@@ -665,7 +666,7 @@
           <a:p>
             <a:fld id="{24E1D275-1CBF-4F78-876E-30D195C0EF8B}" type="datetimeFigureOut">
               <a:rPr lang="de-DE" smtClean="0"/>
-              <a:t>01.05.2021</a:t>
+              <a:t>20.05.2021</a:t>
             </a:fld>
             <a:endParaRPr lang="de-DE"/>
           </a:p>
@@ -863,7 +864,7 @@
           <a:p>
             <a:fld id="{24E1D275-1CBF-4F78-876E-30D195C0EF8B}" type="datetimeFigureOut">
               <a:rPr lang="de-DE" smtClean="0"/>
-              <a:t>01.05.2021</a:t>
+              <a:t>20.05.2021</a:t>
             </a:fld>
             <a:endParaRPr lang="de-DE"/>
           </a:p>
@@ -1138,7 +1139,7 @@
           <a:p>
             <a:fld id="{24E1D275-1CBF-4F78-876E-30D195C0EF8B}" type="datetimeFigureOut">
               <a:rPr lang="de-DE" smtClean="0"/>
-              <a:t>01.05.2021</a:t>
+              <a:t>20.05.2021</a:t>
             </a:fld>
             <a:endParaRPr lang="de-DE"/>
           </a:p>
@@ -1403,7 +1404,7 @@
           <a:p>
             <a:fld id="{24E1D275-1CBF-4F78-876E-30D195C0EF8B}" type="datetimeFigureOut">
               <a:rPr lang="de-DE" smtClean="0"/>
-              <a:t>01.05.2021</a:t>
+              <a:t>20.05.2021</a:t>
             </a:fld>
             <a:endParaRPr lang="de-DE"/>
           </a:p>
@@ -1815,7 +1816,7 @@
           <a:p>
             <a:fld id="{24E1D275-1CBF-4F78-876E-30D195C0EF8B}" type="datetimeFigureOut">
               <a:rPr lang="de-DE" smtClean="0"/>
-              <a:t>01.05.2021</a:t>
+              <a:t>20.05.2021</a:t>
             </a:fld>
             <a:endParaRPr lang="de-DE"/>
           </a:p>
@@ -1956,7 +1957,7 @@
           <a:p>
             <a:fld id="{24E1D275-1CBF-4F78-876E-30D195C0EF8B}" type="datetimeFigureOut">
               <a:rPr lang="de-DE" smtClean="0"/>
-              <a:t>01.05.2021</a:t>
+              <a:t>20.05.2021</a:t>
             </a:fld>
             <a:endParaRPr lang="de-DE"/>
           </a:p>
@@ -2069,7 +2070,7 @@
           <a:p>
             <a:fld id="{24E1D275-1CBF-4F78-876E-30D195C0EF8B}" type="datetimeFigureOut">
               <a:rPr lang="de-DE" smtClean="0"/>
-              <a:t>01.05.2021</a:t>
+              <a:t>20.05.2021</a:t>
             </a:fld>
             <a:endParaRPr lang="de-DE"/>
           </a:p>
@@ -2380,7 +2381,7 @@
           <a:p>
             <a:fld id="{24E1D275-1CBF-4F78-876E-30D195C0EF8B}" type="datetimeFigureOut">
               <a:rPr lang="de-DE" smtClean="0"/>
-              <a:t>01.05.2021</a:t>
+              <a:t>20.05.2021</a:t>
             </a:fld>
             <a:endParaRPr lang="de-DE"/>
           </a:p>
@@ -2668,7 +2669,7 @@
           <a:p>
             <a:fld id="{24E1D275-1CBF-4F78-876E-30D195C0EF8B}" type="datetimeFigureOut">
               <a:rPr lang="de-DE" smtClean="0"/>
-              <a:t>01.05.2021</a:t>
+              <a:t>20.05.2021</a:t>
             </a:fld>
             <a:endParaRPr lang="de-DE"/>
           </a:p>
@@ -2912,7 +2913,7 @@
           <a:p>
             <a:fld id="{24E1D275-1CBF-4F78-876E-30D195C0EF8B}" type="datetimeFigureOut">
               <a:rPr lang="de-DE" smtClean="0"/>
-              <a:t>01.05.2021</a:t>
+              <a:t>20.05.2021</a:t>
             </a:fld>
             <a:endParaRPr lang="de-DE"/>
           </a:p>
@@ -3708,6 +3709,296 @@
 </p:sld>
 </file>
 
+<file path=ppt/slides/slide2.xml><?xml version="1.0" encoding="utf-8"?>
+<p:sld xmlns:a="http://schemas.openxmlformats.org/drawingml/2006/main" xmlns:r="http://schemas.openxmlformats.org/officeDocument/2006/relationships" xmlns:p="http://schemas.openxmlformats.org/presentationml/2006/main">
+  <p:cSld>
+    <p:spTree>
+      <p:nvGrpSpPr>
+        <p:cNvPr id="1" name=""/>
+        <p:cNvGrpSpPr/>
+        <p:nvPr/>
+      </p:nvGrpSpPr>
+      <p:grpSpPr>
+        <a:xfrm>
+          <a:off x="0" y="0"/>
+          <a:ext cx="0" cy="0"/>
+          <a:chOff x="0" y="0"/>
+          <a:chExt cx="0" cy="0"/>
+        </a:xfrm>
+      </p:grpSpPr>
+      <p:sp>
+        <p:nvSpPr>
+          <p:cNvPr id="4" name="Textfeld 3">
+            <a:extLst>
+              <a:ext uri="{FF2B5EF4-FFF2-40B4-BE49-F238E27FC236}">
+                <a16:creationId xmlns:a16="http://schemas.microsoft.com/office/drawing/2014/main" id="{1EE79C27-CD88-45C6-8FEF-CF562D7C78EE}"/>
+              </a:ext>
+            </a:extLst>
+          </p:cNvPr>
+          <p:cNvSpPr txBox="1"/>
+          <p:nvPr/>
+        </p:nvSpPr>
+        <p:spPr>
+          <a:xfrm>
+            <a:off x="5819749" y="1501030"/>
+            <a:ext cx="535723" cy="3709349"/>
+          </a:xfrm>
+          <a:prstGeom prst="rect">
+            <a:avLst/>
+          </a:prstGeom>
+          <a:noFill/>
+        </p:spPr>
+        <p:txBody>
+          <a:bodyPr wrap="none" rtlCol="0">
+            <a:spAutoFit/>
+          </a:bodyPr>
+          <a:lstStyle/>
+          <a:p>
+            <a:pPr algn="ctr">
+              <a:lnSpc>
+                <a:spcPct val="150000"/>
+              </a:lnSpc>
+            </a:pPr>
+            <a:r>
+              <a:rPr lang="en-US" sz="3200" dirty="0">
+                <a:solidFill>
+                  <a:schemeClr val="bg1"/>
+                </a:solidFill>
+              </a:rPr>
+              <a:t>T</a:t>
+            </a:r>
+          </a:p>
+          <a:p>
+            <a:pPr algn="ctr">
+              <a:lnSpc>
+                <a:spcPct val="150000"/>
+              </a:lnSpc>
+            </a:pPr>
+            <a:r>
+              <a:rPr lang="en-US" sz="3200" dirty="0">
+                <a:solidFill>
+                  <a:schemeClr val="bg1"/>
+                </a:solidFill>
+              </a:rPr>
+              <a:t>G</a:t>
+            </a:r>
+          </a:p>
+          <a:p>
+            <a:pPr algn="ctr">
+              <a:lnSpc>
+                <a:spcPct val="150000"/>
+              </a:lnSpc>
+            </a:pPr>
+            <a:r>
+              <a:rPr lang="en-US" sz="3200" dirty="0">
+                <a:solidFill>
+                  <a:schemeClr val="bg1"/>
+                </a:solidFill>
+              </a:rPr>
+              <a:t>R</a:t>
+            </a:r>
+          </a:p>
+          <a:p>
+            <a:pPr algn="ctr">
+              <a:lnSpc>
+                <a:spcPct val="150000"/>
+              </a:lnSpc>
+            </a:pPr>
+            <a:r>
+              <a:rPr lang="en-US" sz="3200" dirty="0">
+                <a:solidFill>
+                  <a:schemeClr val="bg1"/>
+                </a:solidFill>
+              </a:rPr>
+              <a:t>I</a:t>
+            </a:r>
+          </a:p>
+          <a:p>
+            <a:pPr algn="ctr">
+              <a:lnSpc>
+                <a:spcPct val="150000"/>
+              </a:lnSpc>
+            </a:pPr>
+            <a:r>
+              <a:rPr lang="en-US" sz="3200" dirty="0">
+                <a:solidFill>
+                  <a:schemeClr val="bg1"/>
+                </a:solidFill>
+              </a:rPr>
+              <a:t>M</a:t>
+            </a:r>
+          </a:p>
+        </p:txBody>
+      </p:sp>
+      <p:sp>
+        <p:nvSpPr>
+          <p:cNvPr id="7" name="Textfeld 6">
+            <a:extLst>
+              <a:ext uri="{FF2B5EF4-FFF2-40B4-BE49-F238E27FC236}">
+                <a16:creationId xmlns:a16="http://schemas.microsoft.com/office/drawing/2014/main" id="{14F32069-FAF2-45C8-A751-FEB9CDF3743C}"/>
+              </a:ext>
+            </a:extLst>
+          </p:cNvPr>
+          <p:cNvSpPr txBox="1"/>
+          <p:nvPr/>
+        </p:nvSpPr>
+        <p:spPr>
+          <a:xfrm>
+            <a:off x="7482581" y="1988190"/>
+            <a:ext cx="3552576" cy="3046988"/>
+          </a:xfrm>
+          <a:prstGeom prst="rect">
+            <a:avLst/>
+          </a:prstGeom>
+          <a:noFill/>
+        </p:spPr>
+        <p:txBody>
+          <a:bodyPr wrap="none" rtlCol="0">
+            <a:spAutoFit/>
+          </a:bodyPr>
+          <a:lstStyle/>
+          <a:p>
+            <a:r>
+              <a:rPr lang="en-US" sz="3200" dirty="0">
+                <a:solidFill>
+                  <a:schemeClr val="bg1"/>
+                </a:solidFill>
+              </a:rPr>
+              <a:t>some text goes here</a:t>
+            </a:r>
+          </a:p>
+          <a:p>
+            <a:r>
+              <a:rPr lang="en-US" sz="3200" dirty="0">
+                <a:solidFill>
+                  <a:schemeClr val="bg1"/>
+                </a:solidFill>
+              </a:rPr>
+              <a:t>some text goes here</a:t>
+            </a:r>
+          </a:p>
+          <a:p>
+            <a:r>
+              <a:rPr lang="en-US" sz="3200" dirty="0">
+                <a:solidFill>
+                  <a:schemeClr val="bg1"/>
+                </a:solidFill>
+              </a:rPr>
+              <a:t>some text goes here</a:t>
+            </a:r>
+          </a:p>
+          <a:p>
+            <a:r>
+              <a:rPr lang="en-US" sz="3200" dirty="0">
+                <a:solidFill>
+                  <a:schemeClr val="bg1"/>
+                </a:solidFill>
+              </a:rPr>
+              <a:t>some text goes here</a:t>
+            </a:r>
+          </a:p>
+          <a:p>
+            <a:r>
+              <a:rPr lang="en-US" sz="3200" dirty="0">
+                <a:solidFill>
+                  <a:schemeClr val="bg1"/>
+                </a:solidFill>
+              </a:rPr>
+              <a:t>some text goes here</a:t>
+            </a:r>
+          </a:p>
+          <a:p>
+            <a:r>
+              <a:rPr lang="en-US" sz="3200" dirty="0">
+                <a:solidFill>
+                  <a:schemeClr val="bg1"/>
+                </a:solidFill>
+              </a:rPr>
+              <a:t>some text goes here</a:t>
+            </a:r>
+          </a:p>
+        </p:txBody>
+      </p:sp>
+      <p:sp>
+        <p:nvSpPr>
+          <p:cNvPr id="2" name="Pfeil: nach links 1">
+            <a:extLst>
+              <a:ext uri="{FF2B5EF4-FFF2-40B4-BE49-F238E27FC236}">
+                <a16:creationId xmlns:a16="http://schemas.microsoft.com/office/drawing/2014/main" id="{26375758-71B8-4442-9378-0D177FBE64E3}"/>
+              </a:ext>
+            </a:extLst>
+          </p:cNvPr>
+          <p:cNvSpPr/>
+          <p:nvPr/>
+        </p:nvSpPr>
+        <p:spPr>
+          <a:xfrm>
+            <a:off x="1781660" y="2862743"/>
+            <a:ext cx="2910980" cy="1132514"/>
+          </a:xfrm>
+          <a:prstGeom prst="leftArrow">
+            <a:avLst>
+              <a:gd name="adj1" fmla="val 50000"/>
+              <a:gd name="adj2" fmla="val 76667"/>
+            </a:avLst>
+          </a:prstGeom>
+          <a:solidFill>
+            <a:schemeClr val="tx1">
+              <a:lumMod val="85000"/>
+              <a:lumOff val="15000"/>
+            </a:schemeClr>
+          </a:solidFill>
+          <a:ln>
+            <a:solidFill>
+              <a:schemeClr val="tx1">
+                <a:lumMod val="85000"/>
+                <a:lumOff val="15000"/>
+              </a:schemeClr>
+            </a:solidFill>
+          </a:ln>
+        </p:spPr>
+        <p:style>
+          <a:lnRef idx="2">
+            <a:schemeClr val="accent1">
+              <a:shade val="50000"/>
+            </a:schemeClr>
+          </a:lnRef>
+          <a:fillRef idx="1">
+            <a:schemeClr val="accent1"/>
+          </a:fillRef>
+          <a:effectRef idx="0">
+            <a:schemeClr val="accent1"/>
+          </a:effectRef>
+          <a:fontRef idx="minor">
+            <a:schemeClr val="lt1"/>
+          </a:fontRef>
+        </p:style>
+        <p:txBody>
+          <a:bodyPr rtlCol="0" anchor="ctr"/>
+          <a:lstStyle/>
+          <a:p>
+            <a:pPr algn="ctr"/>
+            <a:r>
+              <a:rPr lang="en-US" sz="3200" dirty="0"/>
+              <a:t>back</a:t>
+            </a:r>
+            <a:endParaRPr lang="de-DE" sz="3200" dirty="0"/>
+          </a:p>
+        </p:txBody>
+      </p:sp>
+    </p:spTree>
+    <p:extLst>
+      <p:ext uri="{BB962C8B-B14F-4D97-AF65-F5344CB8AC3E}">
+        <p14:creationId xmlns:p14="http://schemas.microsoft.com/office/powerpoint/2010/main" val="3743237772"/>
+      </p:ext>
+    </p:extLst>
+  </p:cSld>
+  <p:clrMapOvr>
+    <a:masterClrMapping/>
+  </p:clrMapOvr>
+</p:sld>
+</file>
+
 <file path=ppt/theme/theme1.xml><?xml version="1.0" encoding="utf-8"?>
 <a:theme xmlns:a="http://schemas.openxmlformats.org/drawingml/2006/main" name="Office">
   <a:themeElements>

</xml_diff>